<commit_message>
Updated 12 April 2020 4.20PM
</commit_message>
<xml_diff>
--- a/docs/images/bd_pn/bd_pn.pptx
+++ b/docs/images/bd_pn/bd_pn.pptx
@@ -210,7 +210,7 @@
           <a:p>
             <a:fld id="{4520374D-A10D-4F16-A346-D54563820891}" type="datetimeFigureOut">
               <a:rPr lang="en-MY" smtClean="0"/>
-              <a:t>6/4/2020</a:t>
+              <a:t>12/4/2020</a:t>
             </a:fld>
             <a:endParaRPr lang="en-MY"/>
           </a:p>
@@ -817,7 +817,7 @@
           <a:p>
             <a:fld id="{48A87A34-81AB-432B-8DAE-1953F412C126}" type="datetimeFigureOut">
               <a:rPr lang="en-US" dirty="0"/>
-              <a:t>4/6/2020</a:t>
+              <a:t>4/12/2020</a:t>
             </a:fld>
             <a:endParaRPr lang="en-US" dirty="0"/>
           </a:p>
@@ -1079,7 +1079,7 @@
           <a:p>
             <a:fld id="{48A87A34-81AB-432B-8DAE-1953F412C126}" type="datetimeFigureOut">
               <a:rPr lang="en-US" dirty="0"/>
-              <a:t>4/6/2020</a:t>
+              <a:t>4/12/2020</a:t>
             </a:fld>
             <a:endParaRPr lang="en-US" dirty="0"/>
           </a:p>
@@ -1306,7 +1306,7 @@
             <a:fld id="{48A87A34-81AB-432B-8DAE-1953F412C126}" type="datetimeFigureOut">
               <a:rPr lang="en-US" dirty="0"/>
               <a:pPr/>
-              <a:t>4/6/2020</a:t>
+              <a:t>4/12/2020</a:t>
             </a:fld>
             <a:endParaRPr lang="en-US" dirty="0"/>
           </a:p>
@@ -1612,7 +1612,7 @@
             <a:fld id="{48A87A34-81AB-432B-8DAE-1953F412C126}" type="datetimeFigureOut">
               <a:rPr lang="en-US" dirty="0"/>
               <a:pPr/>
-              <a:t>4/6/2020</a:t>
+              <a:t>4/12/2020</a:t>
             </a:fld>
             <a:endParaRPr lang="en-US" dirty="0"/>
           </a:p>
@@ -2081,7 +2081,7 @@
             <a:fld id="{48A87A34-81AB-432B-8DAE-1953F412C126}" type="datetimeFigureOut">
               <a:rPr lang="en-US" dirty="0"/>
               <a:pPr/>
-              <a:t>4/6/2020</a:t>
+              <a:t>4/12/2020</a:t>
             </a:fld>
             <a:endParaRPr lang="en-US" dirty="0"/>
           </a:p>
@@ -2623,7 +2623,7 @@
           <a:p>
             <a:fld id="{48A87A34-81AB-432B-8DAE-1953F412C126}" type="datetimeFigureOut">
               <a:rPr lang="en-US" dirty="0"/>
-              <a:t>4/6/2020</a:t>
+              <a:t>4/12/2020</a:t>
             </a:fld>
             <a:endParaRPr lang="en-US" dirty="0"/>
           </a:p>
@@ -3392,7 +3392,7 @@
           <a:p>
             <a:fld id="{48A87A34-81AB-432B-8DAE-1953F412C126}" type="datetimeFigureOut">
               <a:rPr lang="en-US" dirty="0"/>
-              <a:t>4/6/2020</a:t>
+              <a:t>4/12/2020</a:t>
             </a:fld>
             <a:endParaRPr lang="en-US" dirty="0"/>
           </a:p>
@@ -3562,7 +3562,7 @@
           <a:p>
             <a:fld id="{48A87A34-81AB-432B-8DAE-1953F412C126}" type="datetimeFigureOut">
               <a:rPr lang="en-US" dirty="0"/>
-              <a:t>4/6/2020</a:t>
+              <a:t>4/12/2020</a:t>
             </a:fld>
             <a:endParaRPr lang="en-US" dirty="0"/>
           </a:p>
@@ -3781,7 +3781,7 @@
             <a:fld id="{48A87A34-81AB-432B-8DAE-1953F412C126}" type="datetimeFigureOut">
               <a:rPr lang="en-US" dirty="0"/>
               <a:pPr/>
-              <a:t>4/6/2020</a:t>
+              <a:t>4/12/2020</a:t>
             </a:fld>
             <a:endParaRPr lang="en-US" dirty="0"/>
           </a:p>
@@ -4017,7 +4017,7 @@
           <a:p>
             <a:fld id="{48A87A34-81AB-432B-8DAE-1953F412C126}" type="datetimeFigureOut">
               <a:rPr lang="en-US" smtClean="0"/>
-              <a:t>4/6/2020</a:t>
+              <a:t>4/12/2020</a:t>
             </a:fld>
             <a:endParaRPr lang="en-US" dirty="0"/>
           </a:p>
@@ -4197,7 +4197,7 @@
           <a:p>
             <a:fld id="{48A87A34-81AB-432B-8DAE-1953F412C126}" type="datetimeFigureOut">
               <a:rPr lang="en-US" smtClean="0"/>
-              <a:t>4/6/2020</a:t>
+              <a:t>4/12/2020</a:t>
             </a:fld>
             <a:endParaRPr lang="en-US" dirty="0"/>
           </a:p>
@@ -4367,7 +4367,7 @@
           <a:p>
             <a:fld id="{48A87A34-81AB-432B-8DAE-1953F412C126}" type="datetimeFigureOut">
               <a:rPr lang="en-US" dirty="0"/>
-              <a:t>4/6/2020</a:t>
+              <a:t>4/12/2020</a:t>
             </a:fld>
             <a:endParaRPr lang="en-US" dirty="0"/>
           </a:p>
@@ -4652,7 +4652,7 @@
             <a:fld id="{48A87A34-81AB-432B-8DAE-1953F412C126}" type="datetimeFigureOut">
               <a:rPr lang="en-US" smtClean="0"/>
               <a:pPr/>
-              <a:t>4/6/2020</a:t>
+              <a:t>4/12/2020</a:t>
             </a:fld>
             <a:endParaRPr lang="en-US" dirty="0"/>
           </a:p>
@@ -4894,7 +4894,7 @@
           <a:p>
             <a:fld id="{48A87A34-81AB-432B-8DAE-1953F412C126}" type="datetimeFigureOut">
               <a:rPr lang="en-US" smtClean="0"/>
-              <a:t>4/6/2020</a:t>
+              <a:t>4/12/2020</a:t>
             </a:fld>
             <a:endParaRPr lang="en-US" dirty="0"/>
           </a:p>
@@ -5273,7 +5273,7 @@
           <a:p>
             <a:fld id="{48A87A34-81AB-432B-8DAE-1953F412C126}" type="datetimeFigureOut">
               <a:rPr lang="en-US" smtClean="0"/>
-              <a:t>4/6/2020</a:t>
+              <a:t>4/12/2020</a:t>
             </a:fld>
             <a:endParaRPr lang="en-US" dirty="0"/>
           </a:p>
@@ -5391,7 +5391,7 @@
           <a:p>
             <a:fld id="{48A87A34-81AB-432B-8DAE-1953F412C126}" type="datetimeFigureOut">
               <a:rPr lang="en-US" smtClean="0"/>
-              <a:t>4/6/2020</a:t>
+              <a:t>4/12/2020</a:t>
             </a:fld>
             <a:endParaRPr lang="en-US" dirty="0"/>
           </a:p>
@@ -5486,7 +5486,7 @@
           <a:p>
             <a:fld id="{48A87A34-81AB-432B-8DAE-1953F412C126}" type="datetimeFigureOut">
               <a:rPr lang="en-US" smtClean="0"/>
-              <a:t>4/6/2020</a:t>
+              <a:t>4/12/2020</a:t>
             </a:fld>
             <a:endParaRPr lang="en-US" dirty="0"/>
           </a:p>
@@ -5735,7 +5735,7 @@
           <a:p>
             <a:fld id="{48A87A34-81AB-432B-8DAE-1953F412C126}" type="datetimeFigureOut">
               <a:rPr lang="en-US" smtClean="0"/>
-              <a:t>4/6/2020</a:t>
+              <a:t>4/12/2020</a:t>
             </a:fld>
             <a:endParaRPr lang="en-US" dirty="0"/>
           </a:p>
@@ -5992,7 +5992,7 @@
           <a:p>
             <a:fld id="{48A87A34-81AB-432B-8DAE-1953F412C126}" type="datetimeFigureOut">
               <a:rPr lang="en-US" smtClean="0"/>
-              <a:t>4/6/2020</a:t>
+              <a:t>4/12/2020</a:t>
             </a:fld>
             <a:endParaRPr lang="en-US" dirty="0"/>
           </a:p>
@@ -6249,7 +6249,7 @@
           <a:p>
             <a:fld id="{48A87A34-81AB-432B-8DAE-1953F412C126}" type="datetimeFigureOut">
               <a:rPr lang="en-US" smtClean="0"/>
-              <a:t>4/6/2020</a:t>
+              <a:t>4/12/2020</a:t>
             </a:fld>
             <a:endParaRPr lang="en-US" dirty="0"/>
           </a:p>
@@ -6481,7 +6481,7 @@
             <a:fld id="{48A87A34-81AB-432B-8DAE-1953F412C126}" type="datetimeFigureOut">
               <a:rPr lang="en-US" smtClean="0"/>
               <a:pPr/>
-              <a:t>4/6/2020</a:t>
+              <a:t>4/12/2020</a:t>
             </a:fld>
             <a:endParaRPr lang="en-US" dirty="0"/>
           </a:p>
@@ -6792,7 +6792,7 @@
             <a:fld id="{48A87A34-81AB-432B-8DAE-1953F412C126}" type="datetimeFigureOut">
               <a:rPr lang="en-US" smtClean="0"/>
               <a:pPr/>
-              <a:t>4/6/2020</a:t>
+              <a:t>4/12/2020</a:t>
             </a:fld>
             <a:endParaRPr lang="en-US" dirty="0"/>
           </a:p>
@@ -7324,7 +7324,7 @@
             <a:fld id="{48A87A34-81AB-432B-8DAE-1953F412C126}" type="datetimeFigureOut">
               <a:rPr lang="en-US" dirty="0"/>
               <a:pPr/>
-              <a:t>4/6/2020</a:t>
+              <a:t>4/12/2020</a:t>
             </a:fld>
             <a:endParaRPr lang="en-US" dirty="0"/>
           </a:p>
@@ -7561,7 +7561,7 @@
             <a:fld id="{48A87A34-81AB-432B-8DAE-1953F412C126}" type="datetimeFigureOut">
               <a:rPr lang="en-US" smtClean="0"/>
               <a:pPr/>
-              <a:t>4/6/2020</a:t>
+              <a:t>4/12/2020</a:t>
             </a:fld>
             <a:endParaRPr lang="en-US" dirty="0"/>
           </a:p>
@@ -8108,7 +8108,7 @@
           <a:p>
             <a:fld id="{48A87A34-81AB-432B-8DAE-1953F412C126}" type="datetimeFigureOut">
               <a:rPr lang="en-US" smtClean="0"/>
-              <a:t>4/6/2020</a:t>
+              <a:t>4/12/2020</a:t>
             </a:fld>
             <a:endParaRPr lang="en-US" dirty="0"/>
           </a:p>
@@ -8882,7 +8882,7 @@
           <a:p>
             <a:fld id="{48A87A34-81AB-432B-8DAE-1953F412C126}" type="datetimeFigureOut">
               <a:rPr lang="en-US" smtClean="0"/>
-              <a:t>4/6/2020</a:t>
+              <a:t>4/12/2020</a:t>
             </a:fld>
             <a:endParaRPr lang="en-US" dirty="0"/>
           </a:p>
@@ -9057,7 +9057,7 @@
           <a:p>
             <a:fld id="{48A87A34-81AB-432B-8DAE-1953F412C126}" type="datetimeFigureOut">
               <a:rPr lang="en-US" smtClean="0"/>
-              <a:t>4/6/2020</a:t>
+              <a:t>4/12/2020</a:t>
             </a:fld>
             <a:endParaRPr lang="en-US" dirty="0"/>
           </a:p>
@@ -9281,7 +9281,7 @@
             <a:fld id="{48A87A34-81AB-432B-8DAE-1953F412C126}" type="datetimeFigureOut">
               <a:rPr lang="en-US" smtClean="0"/>
               <a:pPr/>
-              <a:t>4/6/2020</a:t>
+              <a:t>4/12/2020</a:t>
             </a:fld>
             <a:endParaRPr lang="en-US" dirty="0"/>
           </a:p>
@@ -9523,7 +9523,7 @@
           <a:p>
             <a:fld id="{48A87A34-81AB-432B-8DAE-1953F412C126}" type="datetimeFigureOut">
               <a:rPr lang="en-US" dirty="0"/>
-              <a:t>4/6/2020</a:t>
+              <a:t>4/12/2020</a:t>
             </a:fld>
             <a:endParaRPr lang="en-US" dirty="0"/>
           </a:p>
@@ -9897,7 +9897,7 @@
           <a:p>
             <a:fld id="{48A87A34-81AB-432B-8DAE-1953F412C126}" type="datetimeFigureOut">
               <a:rPr lang="en-US" dirty="0"/>
-              <a:t>4/6/2020</a:t>
+              <a:t>4/12/2020</a:t>
             </a:fld>
             <a:endParaRPr lang="en-US" dirty="0"/>
           </a:p>
@@ -10010,7 +10010,7 @@
           <a:p>
             <a:fld id="{48A87A34-81AB-432B-8DAE-1953F412C126}" type="datetimeFigureOut">
               <a:rPr lang="en-US" dirty="0"/>
-              <a:t>4/6/2020</a:t>
+              <a:t>4/12/2020</a:t>
             </a:fld>
             <a:endParaRPr lang="en-US" dirty="0"/>
           </a:p>
@@ -10100,7 +10100,7 @@
           <a:p>
             <a:fld id="{48A87A34-81AB-432B-8DAE-1953F412C126}" type="datetimeFigureOut">
               <a:rPr lang="en-US" dirty="0"/>
-              <a:t>4/6/2020</a:t>
+              <a:t>4/12/2020</a:t>
             </a:fld>
             <a:endParaRPr lang="en-US" dirty="0"/>
           </a:p>
@@ -10344,7 +10344,7 @@
           <a:p>
             <a:fld id="{48A87A34-81AB-432B-8DAE-1953F412C126}" type="datetimeFigureOut">
               <a:rPr lang="en-US" dirty="0"/>
-              <a:t>4/6/2020</a:t>
+              <a:t>4/12/2020</a:t>
             </a:fld>
             <a:endParaRPr lang="en-US" dirty="0"/>
           </a:p>
@@ -10596,7 +10596,7 @@
           <a:p>
             <a:fld id="{48A87A34-81AB-432B-8DAE-1953F412C126}" type="datetimeFigureOut">
               <a:rPr lang="en-US" dirty="0"/>
-              <a:t>4/6/2020</a:t>
+              <a:t>4/12/2020</a:t>
             </a:fld>
             <a:endParaRPr lang="en-US" dirty="0"/>
           </a:p>
@@ -10839,7 +10839,7 @@
             <a:fld id="{48A87A34-81AB-432B-8DAE-1953F412C126}" type="datetimeFigureOut">
               <a:rPr lang="en-US" smtClean="0"/>
               <a:pPr/>
-              <a:t>4/6/2020</a:t>
+              <a:t>4/12/2020</a:t>
             </a:fld>
             <a:endParaRPr lang="en-US" dirty="0"/>
           </a:p>
@@ -11490,7 +11490,7 @@
             <a:fld id="{48A87A34-81AB-432B-8DAE-1953F412C126}" type="datetimeFigureOut">
               <a:rPr lang="en-US" smtClean="0"/>
               <a:pPr/>
-              <a:t>4/6/2020</a:t>
+              <a:t>4/12/2020</a:t>
             </a:fld>
             <a:endParaRPr lang="en-US" dirty="0"/>
           </a:p>
@@ -11782,7 +11782,7 @@
             <a:fld id="{48A87A34-81AB-432B-8DAE-1953F412C126}" type="datetimeFigureOut">
               <a:rPr lang="en-US" smtClean="0"/>
               <a:pPr/>
-              <a:t>4/6/2020</a:t>
+              <a:t>4/12/2020</a:t>
             </a:fld>
             <a:endParaRPr lang="en-US" dirty="0"/>
           </a:p>
@@ -12678,7 +12678,7 @@
           <a:graphicData uri="http://schemas.openxmlformats.org/presentationml/2006/ole">
             <mc:AlternateContent xmlns:mc="http://schemas.openxmlformats.org/markup-compatibility/2006">
               <mc:Choice xmlns:v="urn:schemas-microsoft-com:vml" Requires="v">
-                <p:oleObj spid="_x0000_s40980" name="Equation" r:id="rId3" imgW="583920" imgH="393480" progId="Equation.3">
+                <p:oleObj spid="_x0000_s40988" name="Equation" r:id="rId3" imgW="583920" imgH="393480" progId="Equation.3">
                   <p:embed/>
                 </p:oleObj>
               </mc:Choice>
@@ -12754,7 +12754,7 @@
           <a:graphicData uri="http://schemas.openxmlformats.org/presentationml/2006/ole">
             <mc:AlternateContent xmlns:mc="http://schemas.openxmlformats.org/markup-compatibility/2006">
               <mc:Choice xmlns:v="urn:schemas-microsoft-com:vml" Requires="v">
-                <p:oleObj spid="_x0000_s40981" name="Equation" r:id="rId5" imgW="609336" imgH="393529" progId="Equation.3">
+                <p:oleObj spid="_x0000_s40989" name="Equation" r:id="rId5" imgW="609336" imgH="393529" progId="Equation.3">
                   <p:embed/>
                 </p:oleObj>
               </mc:Choice>
@@ -13157,7 +13157,7 @@
           <a:graphicData uri="http://schemas.openxmlformats.org/presentationml/2006/ole">
             <mc:AlternateContent xmlns:mc="http://schemas.openxmlformats.org/markup-compatibility/2006">
               <mc:Choice xmlns:v="urn:schemas-microsoft-com:vml" Requires="v">
-                <p:oleObj spid="_x0000_s45064" name="Equation" r:id="rId3" imgW="1930320" imgH="2209680" progId="Equation.3">
+                <p:oleObj spid="_x0000_s45070" name="Equation" r:id="rId3" imgW="1930320" imgH="2209680" progId="Equation.3">
                   <p:embed/>
                 </p:oleObj>
               </mc:Choice>
@@ -13224,7 +13224,7 @@
           <a:graphicData uri="http://schemas.openxmlformats.org/presentationml/2006/ole">
             <mc:AlternateContent xmlns:mc="http://schemas.openxmlformats.org/markup-compatibility/2006">
               <mc:Choice xmlns:v="urn:schemas-microsoft-com:vml" Requires="v">
-                <p:oleObj spid="_x0000_s45065" name="Equation" r:id="rId5" imgW="1396800" imgH="1269720" progId="Equation.3">
+                <p:oleObj spid="_x0000_s45071" name="Equation" r:id="rId5" imgW="1396800" imgH="1269720" progId="Equation.3">
                   <p:embed/>
                 </p:oleObj>
               </mc:Choice>
@@ -13817,7 +13817,7 @@
             </a:pPr>
             <a:r>
               <a:rPr lang="en-US" dirty="0"/>
-              <a:t>There note can be with or without interest. In this course, the interest bearing note will be calculated as simple interest using Banker’s Rule.</a:t>
+              <a:t>The note can be with or without interest. In this course, the interest bearing note will be calculated as simple interest using Banker’s Rule.</a:t>
             </a:r>
             <a:endParaRPr lang="en-MY" dirty="0"/>
           </a:p>
@@ -14955,7 +14955,7 @@
           <a:graphicData uri="http://schemas.openxmlformats.org/presentationml/2006/ole">
             <mc:AlternateContent xmlns:mc="http://schemas.openxmlformats.org/markup-compatibility/2006">
               <mc:Choice xmlns:v="urn:schemas-microsoft-com:vml" Requires="v">
-                <p:oleObj spid="_x0000_s43020" name="Equation" r:id="rId3" imgW="1562040" imgH="888840" progId="Equation.3">
+                <p:oleObj spid="_x0000_s43026" name="Equation" r:id="rId3" imgW="1562040" imgH="888840" progId="Equation.3">
                   <p:embed/>
                 </p:oleObj>
               </mc:Choice>
@@ -15022,7 +15022,7 @@
           <a:graphicData uri="http://schemas.openxmlformats.org/presentationml/2006/ole">
             <mc:AlternateContent xmlns:mc="http://schemas.openxmlformats.org/markup-compatibility/2006">
               <mc:Choice xmlns:v="urn:schemas-microsoft-com:vml" Requires="v">
-                <p:oleObj spid="_x0000_s43021" name="Equation" r:id="rId5" imgW="1917360" imgH="1117440" progId="Equation.3">
+                <p:oleObj spid="_x0000_s43027" name="Equation" r:id="rId5" imgW="1917360" imgH="1117440" progId="Equation.3">
                   <p:embed/>
                 </p:oleObj>
               </mc:Choice>
@@ -15198,7 +15198,7 @@
           <a:graphicData uri="http://schemas.openxmlformats.org/presentationml/2006/ole">
             <mc:AlternateContent xmlns:mc="http://schemas.openxmlformats.org/markup-compatibility/2006">
               <mc:Choice xmlns:v="urn:schemas-microsoft-com:vml" Requires="v">
-                <p:oleObj spid="_x0000_s44046" name="Equation" r:id="rId3" imgW="1879560" imgH="1803240" progId="Equation.3">
+                <p:oleObj spid="_x0000_s44052" name="Equation" r:id="rId3" imgW="1879560" imgH="1803240" progId="Equation.3">
                   <p:embed/>
                 </p:oleObj>
               </mc:Choice>
@@ -15265,7 +15265,7 @@
           <a:graphicData uri="http://schemas.openxmlformats.org/presentationml/2006/ole">
             <mc:AlternateContent xmlns:mc="http://schemas.openxmlformats.org/markup-compatibility/2006">
               <mc:Choice xmlns:v="urn:schemas-microsoft-com:vml" Requires="v">
-                <p:oleObj spid="_x0000_s44047" name="Equation" r:id="rId5" imgW="1815840" imgH="888840" progId="Equation.3">
+                <p:oleObj spid="_x0000_s44053" name="Equation" r:id="rId5" imgW="1815840" imgH="888840" progId="Equation.3">
                   <p:embed/>
                 </p:oleObj>
               </mc:Choice>

</xml_diff>